<commit_message>
update dialogs and presentation
</commit_message>
<xml_diff>
--- a/Квест «Побег из белого дома».pptx
+++ b/Квест «Побег из белого дома».pptx
@@ -7,8 +7,11 @@
   <p:sldIdLst>
     <p:sldId id="256" r:id="rId2"/>
     <p:sldId id="257" r:id="rId3"/>
-    <p:sldId id="258" r:id="rId4"/>
-    <p:sldId id="259" r:id="rId5"/>
+    <p:sldId id="262" r:id="rId4"/>
+    <p:sldId id="263" r:id="rId5"/>
+    <p:sldId id="258" r:id="rId6"/>
+    <p:sldId id="260" r:id="rId7"/>
+    <p:sldId id="265" r:id="rId8"/>
   </p:sldIdLst>
   <p:sldSz cx="12192000" cy="6858000"/>
   <p:notesSz cx="6858000" cy="9144000"/>
@@ -107,6 +110,11 @@
       </a:defRPr>
     </a:lvl9pPr>
   </p:defaultTextStyle>
+  <p:extLst>
+    <p:ext uri="{EFAFB233-063F-42B5-8137-9DF3F51BA10A}">
+      <p15:sldGuideLst xmlns:p15="http://schemas.microsoft.com/office/powerpoint/2012/main"/>
+    </p:ext>
+  </p:extLst>
 </p:presentation>
 </file>
 
@@ -241,7 +249,7 @@
           <a:p>
             <a:fld id="{A2F91AB7-3218-41B6-B06E-CA3F9AFE609D}" type="datetimeFigureOut">
               <a:rPr lang="ru-RU" smtClean="0"/>
-              <a:t>30.04.2019</a:t>
+              <a:t>03.05.2019</a:t>
             </a:fld>
             <a:endParaRPr lang="ru-RU"/>
           </a:p>
@@ -411,7 +419,7 @@
           <a:p>
             <a:fld id="{A2F91AB7-3218-41B6-B06E-CA3F9AFE609D}" type="datetimeFigureOut">
               <a:rPr lang="ru-RU" smtClean="0"/>
-              <a:t>30.04.2019</a:t>
+              <a:t>03.05.2019</a:t>
             </a:fld>
             <a:endParaRPr lang="ru-RU"/>
           </a:p>
@@ -591,7 +599,7 @@
           <a:p>
             <a:fld id="{A2F91AB7-3218-41B6-B06E-CA3F9AFE609D}" type="datetimeFigureOut">
               <a:rPr lang="ru-RU" smtClean="0"/>
-              <a:t>30.04.2019</a:t>
+              <a:t>03.05.2019</a:t>
             </a:fld>
             <a:endParaRPr lang="ru-RU"/>
           </a:p>
@@ -761,7 +769,7 @@
           <a:p>
             <a:fld id="{A2F91AB7-3218-41B6-B06E-CA3F9AFE609D}" type="datetimeFigureOut">
               <a:rPr lang="ru-RU" smtClean="0"/>
-              <a:t>30.04.2019</a:t>
+              <a:t>03.05.2019</a:t>
             </a:fld>
             <a:endParaRPr lang="ru-RU"/>
           </a:p>
@@ -1007,7 +1015,7 @@
           <a:p>
             <a:fld id="{A2F91AB7-3218-41B6-B06E-CA3F9AFE609D}" type="datetimeFigureOut">
               <a:rPr lang="ru-RU" smtClean="0"/>
-              <a:t>30.04.2019</a:t>
+              <a:t>03.05.2019</a:t>
             </a:fld>
             <a:endParaRPr lang="ru-RU"/>
           </a:p>
@@ -1239,7 +1247,7 @@
           <a:p>
             <a:fld id="{A2F91AB7-3218-41B6-B06E-CA3F9AFE609D}" type="datetimeFigureOut">
               <a:rPr lang="ru-RU" smtClean="0"/>
-              <a:t>30.04.2019</a:t>
+              <a:t>03.05.2019</a:t>
             </a:fld>
             <a:endParaRPr lang="ru-RU"/>
           </a:p>
@@ -1606,7 +1614,7 @@
           <a:p>
             <a:fld id="{A2F91AB7-3218-41B6-B06E-CA3F9AFE609D}" type="datetimeFigureOut">
               <a:rPr lang="ru-RU" smtClean="0"/>
-              <a:t>30.04.2019</a:t>
+              <a:t>03.05.2019</a:t>
             </a:fld>
             <a:endParaRPr lang="ru-RU"/>
           </a:p>
@@ -1724,7 +1732,7 @@
           <a:p>
             <a:fld id="{A2F91AB7-3218-41B6-B06E-CA3F9AFE609D}" type="datetimeFigureOut">
               <a:rPr lang="ru-RU" smtClean="0"/>
-              <a:t>30.04.2019</a:t>
+              <a:t>03.05.2019</a:t>
             </a:fld>
             <a:endParaRPr lang="ru-RU"/>
           </a:p>
@@ -1819,7 +1827,7 @@
           <a:p>
             <a:fld id="{A2F91AB7-3218-41B6-B06E-CA3F9AFE609D}" type="datetimeFigureOut">
               <a:rPr lang="ru-RU" smtClean="0"/>
-              <a:t>30.04.2019</a:t>
+              <a:t>03.05.2019</a:t>
             </a:fld>
             <a:endParaRPr lang="ru-RU"/>
           </a:p>
@@ -2096,7 +2104,7 @@
           <a:p>
             <a:fld id="{A2F91AB7-3218-41B6-B06E-CA3F9AFE609D}" type="datetimeFigureOut">
               <a:rPr lang="ru-RU" smtClean="0"/>
-              <a:t>30.04.2019</a:t>
+              <a:t>03.05.2019</a:t>
             </a:fld>
             <a:endParaRPr lang="ru-RU"/>
           </a:p>
@@ -2349,7 +2357,7 @@
           <a:p>
             <a:fld id="{A2F91AB7-3218-41B6-B06E-CA3F9AFE609D}" type="datetimeFigureOut">
               <a:rPr lang="ru-RU" smtClean="0"/>
-              <a:t>30.04.2019</a:t>
+              <a:t>03.05.2019</a:t>
             </a:fld>
             <a:endParaRPr lang="ru-RU"/>
           </a:p>
@@ -2562,7 +2570,7 @@
           <a:p>
             <a:fld id="{A2F91AB7-3218-41B6-B06E-CA3F9AFE609D}" type="datetimeFigureOut">
               <a:rPr lang="ru-RU" smtClean="0"/>
-              <a:t>30.04.2019</a:t>
+              <a:t>03.05.2019</a:t>
             </a:fld>
             <a:endParaRPr lang="ru-RU"/>
           </a:p>
@@ -2985,14 +2993,16 @@
           <a:lstStyle/>
           <a:p>
             <a:r>
-              <a:rPr lang="ru-RU" b="1" dirty="0" err="1" smtClean="0"/>
-              <a:t>Квест</a:t>
-            </a:r>
-            <a:r>
-              <a:rPr lang="ru-RU" b="1" dirty="0" smtClean="0"/>
-              <a:t> «Побег из белого дома»</a:t>
-            </a:r>
-            <a:endParaRPr lang="ru-RU" dirty="0"/>
+              <a:rPr lang="ru-RU" dirty="0" smtClean="0">
+                <a:latin typeface="Times New Roman" panose="02020603050405020304" pitchFamily="18" charset="0"/>
+                <a:cs typeface="Times New Roman" panose="02020603050405020304" pitchFamily="18" charset="0"/>
+              </a:rPr>
+              <a:t>Квест «Побег из белого дома»</a:t>
+            </a:r>
+            <a:endParaRPr lang="ru-RU" dirty="0">
+              <a:latin typeface="Times New Roman" panose="02020603050405020304" pitchFamily="18" charset="0"/>
+              <a:cs typeface="Times New Roman" panose="02020603050405020304" pitchFamily="18" charset="0"/>
+            </a:endParaRPr>
           </a:p>
         </p:txBody>
       </p:sp>
@@ -3012,18 +3022,16 @@
           <a:lstStyle/>
           <a:p>
             <a:r>
-              <a:rPr lang="ru-RU" dirty="0" smtClean="0"/>
-              <a:t>Подготовил </a:t>
-            </a:r>
-            <a:r>
-              <a:rPr lang="ru-RU" dirty="0" err="1" smtClean="0"/>
-              <a:t>Чебыкин</a:t>
-            </a:r>
-            <a:r>
-              <a:rPr lang="ru-RU" dirty="0" smtClean="0"/>
-              <a:t> Иван</a:t>
-            </a:r>
-            <a:endParaRPr lang="ru-RU" dirty="0"/>
+              <a:rPr lang="ru-RU" dirty="0" smtClean="0">
+                <a:latin typeface="Times New Roman" panose="02020603050405020304" pitchFamily="18" charset="0"/>
+                <a:cs typeface="Times New Roman" panose="02020603050405020304" pitchFamily="18" charset="0"/>
+              </a:rPr>
+              <a:t>Подготовил Чебыкин Иван</a:t>
+            </a:r>
+            <a:endParaRPr lang="ru-RU" dirty="0">
+              <a:latin typeface="Times New Roman" panose="02020603050405020304" pitchFamily="18" charset="0"/>
+              <a:cs typeface="Times New Roman" panose="02020603050405020304" pitchFamily="18" charset="0"/>
+            </a:endParaRPr>
           </a:p>
         </p:txBody>
       </p:sp>
@@ -3037,6 +3045,13 @@
   <p:clrMapOvr>
     <a:masterClrMapping/>
   </p:clrMapOvr>
+  <p:timing>
+    <p:tnLst>
+      <p:par>
+        <p:cTn id="1" dur="indefinite" restart="never" nodeType="tmRoot"/>
+      </p:par>
+    </p:tnLst>
+  </p:timing>
 </p:sld>
 </file>
 
@@ -3069,26 +3084,51 @@
         </p:nvSpPr>
         <p:spPr/>
         <p:txBody>
-          <a:bodyPr/>
-          <a:lstStyle/>
-          <a:p>
-            <a:r>
-              <a:rPr lang="ru-RU" dirty="0" smtClean="0"/>
-              <a:t>Идея. Цель </a:t>
-            </a:r>
-            <a:r>
-              <a:rPr lang="ru-RU" dirty="0" err="1" smtClean="0"/>
+          <a:bodyPr>
+            <a:normAutofit/>
+          </a:bodyPr>
+          <a:lstStyle/>
+          <a:p>
+            <a:pPr algn="ctr"/>
+            <a:r>
+              <a:rPr lang="ru-RU" sz="4000" dirty="0" smtClean="0">
+                <a:latin typeface="Times New Roman" panose="02020603050405020304" pitchFamily="18" charset="0"/>
+                <a:cs typeface="Times New Roman" panose="02020603050405020304" pitchFamily="18" charset="0"/>
+              </a:rPr>
+              <a:t>Цель </a:t>
+            </a:r>
+            <a:r>
+              <a:rPr lang="ru-RU" sz="4000" dirty="0" smtClean="0">
+                <a:latin typeface="Times New Roman" panose="02020603050405020304" pitchFamily="18" charset="0"/>
+                <a:cs typeface="Times New Roman" panose="02020603050405020304" pitchFamily="18" charset="0"/>
+              </a:rPr>
+              <a:t>квеста. Место </a:t>
+            </a:r>
+            <a:r>
+              <a:rPr lang="ru-RU" sz="4000" dirty="0" smtClean="0">
+                <a:latin typeface="Times New Roman" panose="02020603050405020304" pitchFamily="18" charset="0"/>
+                <a:cs typeface="Times New Roman" panose="02020603050405020304" pitchFamily="18" charset="0"/>
+              </a:rPr>
               <a:t>квеста</a:t>
             </a:r>
             <a:r>
-              <a:rPr lang="ru-RU" dirty="0" smtClean="0"/>
-              <a:t>. Место </a:t>
-            </a:r>
-            <a:r>
-              <a:rPr lang="ru-RU" dirty="0" err="1" smtClean="0"/>
-              <a:t>квеста</a:t>
-            </a:r>
-            <a:endParaRPr lang="ru-RU" dirty="0"/>
+              <a:rPr lang="en-US" sz="4000" dirty="0" smtClean="0">
+                <a:latin typeface="Times New Roman" panose="02020603050405020304" pitchFamily="18" charset="0"/>
+                <a:cs typeface="Times New Roman" panose="02020603050405020304" pitchFamily="18" charset="0"/>
+              </a:rPr>
+              <a:t>. </a:t>
+            </a:r>
+            <a:r>
+              <a:rPr lang="ru-RU" sz="4000" dirty="0" smtClean="0">
+                <a:latin typeface="Times New Roman" panose="02020603050405020304" pitchFamily="18" charset="0"/>
+                <a:cs typeface="Times New Roman" panose="02020603050405020304" pitchFamily="18" charset="0"/>
+              </a:rPr>
+              <a:t>Общая информация</a:t>
+            </a:r>
+            <a:endParaRPr lang="ru-RU" sz="4000" dirty="0">
+              <a:latin typeface="Times New Roman" panose="02020603050405020304" pitchFamily="18" charset="0"/>
+              <a:cs typeface="Times New Roman" panose="02020603050405020304" pitchFamily="18" charset="0"/>
+            </a:endParaRPr>
           </a:p>
         </p:txBody>
       </p:sp>
@@ -3107,78 +3147,86 @@
           <a:bodyPr/>
           <a:lstStyle/>
           <a:p>
-            <a:pPr marL="0" indent="0">
+            <a:pPr marL="0" indent="0" algn="just">
               <a:buNone/>
             </a:pPr>
             <a:r>
-              <a:rPr lang="ru-RU" dirty="0" smtClean="0"/>
-              <a:t>Идею о создании </a:t>
-            </a:r>
-            <a:r>
-              <a:rPr lang="ru-RU" dirty="0" err="1" smtClean="0"/>
-              <a:t>квеста</a:t>
-            </a:r>
-            <a:r>
-              <a:rPr lang="ru-RU" dirty="0" smtClean="0"/>
-              <a:t> мне «подсказал» ученик </a:t>
-            </a:r>
-            <a:r>
-              <a:rPr lang="ru-RU" dirty="0" err="1" smtClean="0"/>
-              <a:t>Яндекс.Лицея</a:t>
-            </a:r>
-            <a:r>
-              <a:rPr lang="ru-RU" dirty="0" smtClean="0"/>
+              <a:rPr lang="ru-RU" dirty="0" smtClean="0">
+                <a:latin typeface="Times New Roman" panose="02020603050405020304" pitchFamily="18" charset="0"/>
+                <a:cs typeface="Times New Roman" panose="02020603050405020304" pitchFamily="18" charset="0"/>
+              </a:rPr>
+              <a:t>Целью квеста является спасение важных документов предназначенных для правительство США</a:t>
+            </a:r>
+            <a:r>
+              <a:rPr lang="ru-RU" dirty="0" smtClean="0">
+                <a:latin typeface="Times New Roman" panose="02020603050405020304" pitchFamily="18" charset="0"/>
+                <a:cs typeface="Times New Roman" panose="02020603050405020304" pitchFamily="18" charset="0"/>
+              </a:rPr>
               <a:t>.</a:t>
             </a:r>
-          </a:p>
-          <a:p>
-            <a:pPr marL="0" indent="0">
+            <a:endParaRPr lang="ru-RU" dirty="0" smtClean="0">
+              <a:latin typeface="Times New Roman" panose="02020603050405020304" pitchFamily="18" charset="0"/>
+              <a:cs typeface="Times New Roman" panose="02020603050405020304" pitchFamily="18" charset="0"/>
+            </a:endParaRPr>
+          </a:p>
+          <a:p>
+            <a:pPr marL="0" indent="0" algn="just">
               <a:buNone/>
             </a:pPr>
             <a:r>
-              <a:rPr lang="ru-RU" dirty="0" smtClean="0"/>
-              <a:t>Целью </a:t>
-            </a:r>
-            <a:r>
-              <a:rPr lang="ru-RU" dirty="0" err="1" smtClean="0"/>
-              <a:t>квеста</a:t>
-            </a:r>
-            <a:r>
-              <a:rPr lang="ru-RU" dirty="0" smtClean="0"/>
-              <a:t> является спасение важных документов предназначенных для правительство США.</a:t>
-            </a:r>
-          </a:p>
-          <a:p>
-            <a:pPr marL="0" indent="0">
+              <a:rPr lang="ru-RU" dirty="0" smtClean="0">
+                <a:latin typeface="Times New Roman" panose="02020603050405020304" pitchFamily="18" charset="0"/>
+                <a:cs typeface="Times New Roman" panose="02020603050405020304" pitchFamily="18" charset="0"/>
+              </a:rPr>
+              <a:t>Место квеста расположено в Белом Доме, в Вашингтоне</a:t>
+            </a:r>
+            <a:r>
+              <a:rPr lang="ru-RU" dirty="0" smtClean="0">
+                <a:latin typeface="Times New Roman" panose="02020603050405020304" pitchFamily="18" charset="0"/>
+                <a:cs typeface="Times New Roman" panose="02020603050405020304" pitchFamily="18" charset="0"/>
+              </a:rPr>
+              <a:t>. </a:t>
+            </a:r>
+          </a:p>
+          <a:p>
+            <a:pPr marL="0" indent="0" algn="just">
               <a:buNone/>
             </a:pPr>
             <a:r>
-              <a:rPr lang="ru-RU" dirty="0" smtClean="0"/>
-              <a:t>Место </a:t>
-            </a:r>
-            <a:r>
-              <a:rPr lang="ru-RU" dirty="0" err="1" smtClean="0"/>
-              <a:t>квеста</a:t>
-            </a:r>
-            <a:r>
-              <a:rPr lang="ru-RU" dirty="0" smtClean="0"/>
-              <a:t> расположено в Белом Доме, в Вашингтоне.</a:t>
-            </a:r>
-          </a:p>
-          <a:p>
-            <a:pPr marL="0" indent="0">
+              <a:rPr lang="ru-RU" dirty="0" smtClean="0">
+                <a:latin typeface="Times New Roman" panose="02020603050405020304" pitchFamily="18" charset="0"/>
+                <a:cs typeface="Times New Roman" panose="02020603050405020304" pitchFamily="18" charset="0"/>
+              </a:rPr>
+              <a:t>В квесте есть 3 концовки.</a:t>
+            </a:r>
+          </a:p>
+          <a:p>
+            <a:pPr marL="0" indent="0" algn="just">
               <a:buNone/>
             </a:pPr>
             <a:r>
-              <a:rPr lang="ru-RU" dirty="0" smtClean="0"/>
-              <a:t>Изображения, используемые в диалоге взяты из интернета.</a:t>
-            </a:r>
-          </a:p>
-          <a:p>
-            <a:pPr marL="0" indent="0">
+              <a:rPr lang="ru-RU" dirty="0" smtClean="0">
+                <a:latin typeface="Times New Roman" panose="02020603050405020304" pitchFamily="18" charset="0"/>
+                <a:cs typeface="Times New Roman" panose="02020603050405020304" pitchFamily="18" charset="0"/>
+              </a:rPr>
+              <a:t>На следующих слайдах представлена информация о логике квеста и карте квеста.</a:t>
+            </a:r>
+          </a:p>
+          <a:p>
+            <a:pPr marL="0" indent="0" algn="just">
               <a:buNone/>
             </a:pPr>
-            <a:endParaRPr lang="ru-RU" dirty="0"/>
+            <a:r>
+              <a:rPr lang="ru-RU" dirty="0" smtClean="0">
+                <a:latin typeface="Times New Roman" panose="02020603050405020304" pitchFamily="18" charset="0"/>
+                <a:cs typeface="Times New Roman" panose="02020603050405020304" pitchFamily="18" charset="0"/>
+              </a:rPr>
+              <a:t>С остальной информацией вы можете ознакомиться непосредственно пройдя квест.</a:t>
+            </a:r>
+            <a:endParaRPr lang="ru-RU" dirty="0" smtClean="0">
+              <a:latin typeface="Times New Roman" panose="02020603050405020304" pitchFamily="18" charset="0"/>
+              <a:cs typeface="Times New Roman" panose="02020603050405020304" pitchFamily="18" charset="0"/>
+            </a:endParaRPr>
           </a:p>
         </p:txBody>
       </p:sp>
@@ -3192,6 +3240,13 @@
   <p:clrMapOvr>
     <a:masterClrMapping/>
   </p:clrMapOvr>
+  <p:timing>
+    <p:tnLst>
+      <p:par>
+        <p:cTn id="1" dur="indefinite" restart="never" nodeType="tmRoot"/>
+      </p:par>
+    </p:tnLst>
+  </p:timing>
 </p:sld>
 </file>
 
@@ -3227,15 +3282,52 @@
           <a:bodyPr/>
           <a:lstStyle/>
           <a:p>
-            <a:r>
-              <a:rPr lang="ru-RU" dirty="0" err="1" smtClean="0"/>
-              <a:t>Стуктура</a:t>
-            </a:r>
-            <a:r>
-              <a:rPr lang="ru-RU" dirty="0" smtClean="0"/>
-              <a:t>.</a:t>
-            </a:r>
-            <a:endParaRPr lang="ru-RU" dirty="0"/>
+            <a:pPr algn="ctr"/>
+            <a:r>
+              <a:rPr lang="ru-RU" dirty="0" smtClean="0">
+                <a:latin typeface="Times New Roman" panose="02020603050405020304" pitchFamily="18" charset="0"/>
+                <a:cs typeface="Times New Roman" panose="02020603050405020304" pitchFamily="18" charset="0"/>
+              </a:rPr>
+              <a:t>Логика квеста. </a:t>
+            </a:r>
+            <a:r>
+              <a:rPr lang="ru-RU" b="1" i="1" u="sng" dirty="0" smtClean="0">
+                <a:latin typeface="Times New Roman" panose="02020603050405020304" pitchFamily="18" charset="0"/>
+                <a:cs typeface="Times New Roman" panose="02020603050405020304" pitchFamily="18" charset="0"/>
+              </a:rPr>
+              <a:t>Внимание </a:t>
+            </a:r>
+            <a:r>
+              <a:rPr lang="ru-RU" b="1" i="1" u="sng" dirty="0" err="1" smtClean="0">
+                <a:latin typeface="Times New Roman" panose="02020603050405020304" pitchFamily="18" charset="0"/>
+                <a:cs typeface="Times New Roman" panose="02020603050405020304" pitchFamily="18" charset="0"/>
+              </a:rPr>
+              <a:t>спойлеры</a:t>
+            </a:r>
+            <a:r>
+              <a:rPr lang="ru-RU" b="1" i="1" u="sng" dirty="0" smtClean="0">
+                <a:latin typeface="Times New Roman" panose="02020603050405020304" pitchFamily="18" charset="0"/>
+                <a:cs typeface="Times New Roman" panose="02020603050405020304" pitchFamily="18" charset="0"/>
+              </a:rPr>
+              <a:t>!</a:t>
+            </a:r>
+            <a:br>
+              <a:rPr lang="ru-RU" b="1" i="1" u="sng" dirty="0" smtClean="0">
+                <a:latin typeface="Times New Roman" panose="02020603050405020304" pitchFamily="18" charset="0"/>
+                <a:cs typeface="Times New Roman" panose="02020603050405020304" pitchFamily="18" charset="0"/>
+              </a:rPr>
+            </a:br>
+            <a:r>
+              <a:rPr lang="ru-RU" b="1" i="1" u="sng" dirty="0" smtClean="0">
+                <a:latin typeface="Times New Roman" panose="02020603050405020304" pitchFamily="18" charset="0"/>
+                <a:cs typeface="Times New Roman" panose="02020603050405020304" pitchFamily="18" charset="0"/>
+              </a:rPr>
+              <a:t>Желательно пройти квест.</a:t>
+            </a:r>
+            <a:endParaRPr lang="ru-RU" b="1" i="1" u="sng" dirty="0">
+              <a:latin typeface="Times New Roman" panose="02020603050405020304" pitchFamily="18" charset="0"/>
+              <a:cs typeface="Times New Roman" panose="02020603050405020304" pitchFamily="18" charset="0"/>
+            </a:endParaRPr>
           </a:p>
         </p:txBody>
       </p:sp>
@@ -3251,125 +3343,43 @@
         </p:nvSpPr>
         <p:spPr/>
         <p:txBody>
-          <a:bodyPr>
-            <a:normAutofit lnSpcReduction="10000"/>
-          </a:bodyPr>
-          <a:lstStyle/>
-          <a:p>
-            <a:r>
-              <a:rPr lang="en-US" dirty="0"/>
-              <a:t>d</a:t>
-            </a:r>
-            <a:r>
-              <a:rPr lang="en-US" dirty="0" smtClean="0"/>
-              <a:t>ialogs.py – </a:t>
-            </a:r>
-            <a:r>
-              <a:rPr lang="ru-RU" dirty="0" smtClean="0"/>
-              <a:t>файл, содержащий файлы для диалога с пользователем</a:t>
-            </a:r>
-          </a:p>
-          <a:p>
-            <a:r>
-              <a:rPr lang="en-US" dirty="0" smtClean="0"/>
-              <a:t>Flask_app.py –</a:t>
-            </a:r>
-            <a:r>
-              <a:rPr lang="ru-RU" dirty="0" smtClean="0"/>
-              <a:t> файл, запускающий навык</a:t>
-            </a:r>
-          </a:p>
-          <a:p>
-            <a:r>
-              <a:rPr lang="en-US" dirty="0" smtClean="0"/>
-              <a:t>Forresponse.py – </a:t>
-            </a:r>
-            <a:r>
-              <a:rPr lang="ru-RU" dirty="0" smtClean="0"/>
-              <a:t>файл, содержащий класс, предназначенный для упрощающей работы с ответом на команду пользователя</a:t>
-            </a:r>
-          </a:p>
-          <a:p>
-            <a:r>
-              <a:rPr lang="en-US" dirty="0" smtClean="0"/>
-              <a:t>Images.py – </a:t>
-            </a:r>
-            <a:r>
-              <a:rPr lang="ru-RU" dirty="0" smtClean="0"/>
-              <a:t>файл, содержащий</a:t>
-            </a:r>
-            <a:r>
-              <a:rPr lang="en-US" dirty="0" smtClean="0"/>
-              <a:t> </a:t>
-            </a:r>
-            <a:r>
-              <a:rPr lang="ru-RU" dirty="0" smtClean="0"/>
-              <a:t>класс, в котором находятся</a:t>
-            </a:r>
-            <a:r>
-              <a:rPr lang="en-US" dirty="0" smtClean="0"/>
-              <a:t> </a:t>
-            </a:r>
-            <a:r>
-              <a:rPr lang="ru-RU" dirty="0" smtClean="0"/>
-              <a:t>идентификаторы для </a:t>
-            </a:r>
-            <a:r>
-              <a:rPr lang="en-US" dirty="0" err="1" smtClean="0"/>
-              <a:t>api</a:t>
-            </a:r>
-            <a:r>
-              <a:rPr lang="en-US" dirty="0" smtClean="0"/>
-              <a:t> </a:t>
-            </a:r>
-            <a:r>
-              <a:rPr lang="ru-RU" dirty="0" err="1" smtClean="0"/>
-              <a:t>яндекс.диалогов</a:t>
-            </a:r>
-            <a:endParaRPr lang="ru-RU" dirty="0" smtClean="0"/>
-          </a:p>
-          <a:p>
-            <a:r>
-              <a:rPr lang="en-US" dirty="0" smtClean="0"/>
-              <a:t>Quest.py – </a:t>
-            </a:r>
-            <a:r>
-              <a:rPr lang="ru-RU" dirty="0" smtClean="0"/>
-              <a:t>основной файл, содержащий код для создания </a:t>
-            </a:r>
-            <a:r>
-              <a:rPr lang="ru-RU" dirty="0" err="1" smtClean="0"/>
-              <a:t>квеста</a:t>
-            </a:r>
-            <a:endParaRPr lang="ru-RU" dirty="0" smtClean="0"/>
-          </a:p>
-          <a:p>
-            <a:r>
-              <a:rPr lang="en-US" dirty="0" smtClean="0"/>
-              <a:t>Useractions.py – </a:t>
-            </a:r>
-            <a:r>
-              <a:rPr lang="ru-RU" dirty="0" smtClean="0"/>
-              <a:t>файл, отслеживающий действия пользователя на протяжении всего </a:t>
-            </a:r>
-            <a:r>
-              <a:rPr lang="ru-RU" dirty="0" err="1" smtClean="0"/>
-              <a:t>квеста</a:t>
-            </a:r>
-            <a:endParaRPr lang="ru-RU" dirty="0"/>
+          <a:bodyPr/>
+          <a:lstStyle/>
+          <a:p>
+            <a:pPr marL="0" indent="0" algn="just">
+              <a:buNone/>
+            </a:pPr>
+            <a:r>
+              <a:rPr lang="ru-RU" dirty="0" smtClean="0">
+                <a:latin typeface="Times New Roman" panose="02020603050405020304" pitchFamily="18" charset="0"/>
+                <a:cs typeface="Times New Roman" panose="02020603050405020304" pitchFamily="18" charset="0"/>
+              </a:rPr>
+              <a:t>Изначально вы попадаете в начальную комнату, где можете обыскать стол и найти закрытую шкатулку. После разгадки шкатулки вы получите цифру. В комнате с картинами (картинный стенд) находится ещё одна загадка, а именно, код Морзе, который должен разгадать пользователь и получить цифру. В следующей комнате, пользователь должен узнать кто изображен на портрете и получить две цифры. Получив 4 цифры, вы сможете открыть сейф, в котором храниться ключ от столика с противогазом. Получив противогаз, вы можете завершить игру, выбрав одну из двух концовок. Также, можно завершить игру и без противогаза, но с другой концовкой.</a:t>
+            </a:r>
+            <a:endParaRPr lang="ru-RU" dirty="0">
+              <a:latin typeface="Times New Roman" panose="02020603050405020304" pitchFamily="18" charset="0"/>
+              <a:cs typeface="Times New Roman" panose="02020603050405020304" pitchFamily="18" charset="0"/>
+            </a:endParaRPr>
           </a:p>
         </p:txBody>
       </p:sp>
     </p:spTree>
     <p:extLst>
       <p:ext uri="{BB962C8B-B14F-4D97-AF65-F5344CB8AC3E}">
-        <p14:creationId xmlns:p14="http://schemas.microsoft.com/office/powerpoint/2010/main" val="3244797553"/>
+        <p14:creationId xmlns:p14="http://schemas.microsoft.com/office/powerpoint/2010/main" val="1872298007"/>
       </p:ext>
     </p:extLst>
   </p:cSld>
   <p:clrMapOvr>
     <a:masterClrMapping/>
   </p:clrMapOvr>
+  <p:timing>
+    <p:tnLst>
+      <p:par>
+        <p:cTn id="1" dur="indefinite" restart="never" nodeType="tmRoot"/>
+      </p:par>
+    </p:tnLst>
+  </p:timing>
 </p:sld>
 </file>
 
@@ -3400,48 +3410,1316 @@
             <p:ph type="title"/>
           </p:nvPr>
         </p:nvSpPr>
-        <p:spPr/>
-        <p:txBody>
-          <a:bodyPr/>
-          <a:lstStyle/>
-          <a:p>
-            <a:r>
-              <a:rPr lang="ru-RU" dirty="0" smtClean="0"/>
-              <a:t>Скриншоты</a:t>
-            </a:r>
-            <a:endParaRPr lang="ru-RU" dirty="0"/>
-          </a:p>
-        </p:txBody>
-      </p:sp>
-      <p:sp>
-        <p:nvSpPr>
-          <p:cNvPr id="3" name="Объект 2"/>
-          <p:cNvSpPr>
-            <a:spLocks noGrp="1"/>
-          </p:cNvSpPr>
-          <p:nvPr>
-            <p:ph idx="1"/>
-          </p:nvPr>
-        </p:nvSpPr>
-        <p:spPr/>
-        <p:txBody>
-          <a:bodyPr/>
-          <a:lstStyle/>
-          <a:p>
-            <a:endParaRPr lang="ru-RU"/>
-          </a:p>
-        </p:txBody>
-      </p:sp>
+        <p:spPr>
+          <a:xfrm>
+            <a:off x="0" y="0"/>
+            <a:ext cx="12192000" cy="1325563"/>
+          </a:xfrm>
+        </p:spPr>
+        <p:txBody>
+          <a:bodyPr/>
+          <a:lstStyle/>
+          <a:p>
+            <a:pPr algn="ctr"/>
+            <a:r>
+              <a:rPr lang="ru-RU" dirty="0" smtClean="0">
+                <a:latin typeface="Times New Roman" panose="02020603050405020304" pitchFamily="18" charset="0"/>
+                <a:cs typeface="Times New Roman" panose="02020603050405020304" pitchFamily="18" charset="0"/>
+              </a:rPr>
+              <a:t>Карта Белого дома. Места квеста. Взаимодействие между комнатами</a:t>
+            </a:r>
+            <a:endParaRPr lang="ru-RU" dirty="0">
+              <a:latin typeface="Times New Roman" panose="02020603050405020304" pitchFamily="18" charset="0"/>
+              <a:cs typeface="Times New Roman" panose="02020603050405020304" pitchFamily="18" charset="0"/>
+            </a:endParaRPr>
+          </a:p>
+        </p:txBody>
+      </p:sp>
+      <p:sp>
+        <p:nvSpPr>
+          <p:cNvPr id="4" name="Прямоугольник 3"/>
+          <p:cNvSpPr/>
+          <p:nvPr/>
+        </p:nvSpPr>
+        <p:spPr>
+          <a:xfrm>
+            <a:off x="2011679" y="5891089"/>
+            <a:ext cx="1491175" cy="1005840"/>
+          </a:xfrm>
+          <a:prstGeom prst="rect">
+            <a:avLst/>
+          </a:prstGeom>
+        </p:spPr>
+        <p:style>
+          <a:lnRef idx="2">
+            <a:schemeClr val="accent1">
+              <a:shade val="50000"/>
+            </a:schemeClr>
+          </a:lnRef>
+          <a:fillRef idx="1">
+            <a:schemeClr val="accent1"/>
+          </a:fillRef>
+          <a:effectRef idx="0">
+            <a:schemeClr val="accent1"/>
+          </a:effectRef>
+          <a:fontRef idx="minor">
+            <a:schemeClr val="lt1"/>
+          </a:fontRef>
+        </p:style>
+        <p:txBody>
+          <a:bodyPr rtlCol="0" anchor="ctr"/>
+          <a:lstStyle/>
+          <a:p>
+            <a:pPr algn="ctr"/>
+            <a:r>
+              <a:rPr lang="ru-RU" dirty="0" smtClean="0">
+                <a:latin typeface="Times New Roman" panose="02020603050405020304" pitchFamily="18" charset="0"/>
+                <a:cs typeface="Times New Roman" panose="02020603050405020304" pitchFamily="18" charset="0"/>
+              </a:rPr>
+              <a:t>Входная комната</a:t>
+            </a:r>
+            <a:endParaRPr lang="ru-RU" dirty="0">
+              <a:latin typeface="Times New Roman" panose="02020603050405020304" pitchFamily="18" charset="0"/>
+              <a:cs typeface="Times New Roman" panose="02020603050405020304" pitchFamily="18" charset="0"/>
+            </a:endParaRPr>
+          </a:p>
+        </p:txBody>
+      </p:sp>
+      <p:sp>
+        <p:nvSpPr>
+          <p:cNvPr id="7" name="Прямоугольник 6"/>
+          <p:cNvSpPr/>
+          <p:nvPr/>
+        </p:nvSpPr>
+        <p:spPr>
+          <a:xfrm>
+            <a:off x="2011679" y="4723274"/>
+            <a:ext cx="1491175" cy="815926"/>
+          </a:xfrm>
+          <a:prstGeom prst="rect">
+            <a:avLst/>
+          </a:prstGeom>
+        </p:spPr>
+        <p:style>
+          <a:lnRef idx="2">
+            <a:schemeClr val="accent1">
+              <a:shade val="50000"/>
+            </a:schemeClr>
+          </a:lnRef>
+          <a:fillRef idx="1">
+            <a:schemeClr val="accent1"/>
+          </a:fillRef>
+          <a:effectRef idx="0">
+            <a:schemeClr val="accent1"/>
+          </a:effectRef>
+          <a:fontRef idx="minor">
+            <a:schemeClr val="lt1"/>
+          </a:fontRef>
+        </p:style>
+        <p:txBody>
+          <a:bodyPr rtlCol="0" anchor="ctr"/>
+          <a:lstStyle/>
+          <a:p>
+            <a:pPr algn="ctr"/>
+            <a:r>
+              <a:rPr lang="ru-RU" dirty="0" smtClean="0">
+                <a:latin typeface="Times New Roman" panose="02020603050405020304" pitchFamily="18" charset="0"/>
+                <a:cs typeface="Times New Roman" panose="02020603050405020304" pitchFamily="18" charset="0"/>
+              </a:rPr>
+              <a:t>Лестничный </a:t>
+            </a:r>
+            <a:r>
+              <a:rPr lang="ru-RU" dirty="0">
+                <a:latin typeface="Times New Roman" panose="02020603050405020304" pitchFamily="18" charset="0"/>
+                <a:cs typeface="Times New Roman" panose="02020603050405020304" pitchFamily="18" charset="0"/>
+              </a:rPr>
+              <a:t>подъем</a:t>
+            </a:r>
+            <a:endParaRPr lang="ru-RU" dirty="0">
+              <a:latin typeface="Times New Roman" panose="02020603050405020304" pitchFamily="18" charset="0"/>
+              <a:cs typeface="Times New Roman" panose="02020603050405020304" pitchFamily="18" charset="0"/>
+            </a:endParaRPr>
+          </a:p>
+        </p:txBody>
+      </p:sp>
+      <p:sp>
+        <p:nvSpPr>
+          <p:cNvPr id="10" name="Прямоугольник 9"/>
+          <p:cNvSpPr/>
+          <p:nvPr/>
+        </p:nvSpPr>
+        <p:spPr>
+          <a:xfrm>
+            <a:off x="4832253" y="4798494"/>
+            <a:ext cx="2103120" cy="645111"/>
+          </a:xfrm>
+          <a:prstGeom prst="rect">
+            <a:avLst/>
+          </a:prstGeom>
+        </p:spPr>
+        <p:style>
+          <a:lnRef idx="2">
+            <a:schemeClr val="accent1">
+              <a:shade val="50000"/>
+            </a:schemeClr>
+          </a:lnRef>
+          <a:fillRef idx="1">
+            <a:schemeClr val="accent1"/>
+          </a:fillRef>
+          <a:effectRef idx="0">
+            <a:schemeClr val="accent1"/>
+          </a:effectRef>
+          <a:fontRef idx="minor">
+            <a:schemeClr val="lt1"/>
+          </a:fontRef>
+        </p:style>
+        <p:txBody>
+          <a:bodyPr rtlCol="0" anchor="ctr"/>
+          <a:lstStyle/>
+          <a:p>
+            <a:pPr algn="ctr"/>
+            <a:r>
+              <a:rPr lang="ru-RU" dirty="0">
+                <a:latin typeface="Times New Roman" panose="02020603050405020304" pitchFamily="18" charset="0"/>
+                <a:cs typeface="Times New Roman" panose="02020603050405020304" pitchFamily="18" charset="0"/>
+              </a:rPr>
+              <a:t>Картинный стенд</a:t>
+            </a:r>
+            <a:endParaRPr lang="ru-RU" dirty="0">
+              <a:latin typeface="Times New Roman" panose="02020603050405020304" pitchFamily="18" charset="0"/>
+              <a:cs typeface="Times New Roman" panose="02020603050405020304" pitchFamily="18" charset="0"/>
+            </a:endParaRPr>
+          </a:p>
+        </p:txBody>
+      </p:sp>
+      <p:sp>
+        <p:nvSpPr>
+          <p:cNvPr id="20" name="Прямоугольник 19"/>
+          <p:cNvSpPr/>
+          <p:nvPr/>
+        </p:nvSpPr>
+        <p:spPr>
+          <a:xfrm>
+            <a:off x="4832253" y="3752846"/>
+            <a:ext cx="2103120" cy="733280"/>
+          </a:xfrm>
+          <a:prstGeom prst="rect">
+            <a:avLst/>
+          </a:prstGeom>
+        </p:spPr>
+        <p:style>
+          <a:lnRef idx="2">
+            <a:schemeClr val="accent1">
+              <a:shade val="50000"/>
+            </a:schemeClr>
+          </a:lnRef>
+          <a:fillRef idx="1">
+            <a:schemeClr val="accent1"/>
+          </a:fillRef>
+          <a:effectRef idx="0">
+            <a:schemeClr val="accent1"/>
+          </a:effectRef>
+          <a:fontRef idx="minor">
+            <a:schemeClr val="lt1"/>
+          </a:fontRef>
+        </p:style>
+        <p:txBody>
+          <a:bodyPr rtlCol="0" anchor="ctr"/>
+          <a:lstStyle/>
+          <a:p>
+            <a:pPr algn="ctr"/>
+            <a:r>
+              <a:rPr lang="ru-RU" sz="1600" dirty="0">
+                <a:latin typeface="Times New Roman" panose="02020603050405020304" pitchFamily="18" charset="0"/>
+                <a:cs typeface="Times New Roman" panose="02020603050405020304" pitchFamily="18" charset="0"/>
+              </a:rPr>
+              <a:t>Комната с портретом и проходом дальше</a:t>
+            </a:r>
+            <a:endParaRPr lang="ru-RU" sz="1600" dirty="0">
+              <a:latin typeface="Times New Roman" panose="02020603050405020304" pitchFamily="18" charset="0"/>
+              <a:cs typeface="Times New Roman" panose="02020603050405020304" pitchFamily="18" charset="0"/>
+            </a:endParaRPr>
+          </a:p>
+        </p:txBody>
+      </p:sp>
+      <p:cxnSp>
+        <p:nvCxnSpPr>
+          <p:cNvPr id="30" name="Прямая со стрелкой 29"/>
+          <p:cNvCxnSpPr>
+            <a:stCxn id="7" idx="0"/>
+            <a:endCxn id="20" idx="1"/>
+          </p:cNvCxnSpPr>
+          <p:nvPr/>
+        </p:nvCxnSpPr>
+        <p:spPr>
+          <a:xfrm flipV="1">
+            <a:off x="2757267" y="4119486"/>
+            <a:ext cx="2074986" cy="603788"/>
+          </a:xfrm>
+          <a:prstGeom prst="straightConnector1">
+            <a:avLst/>
+          </a:prstGeom>
+          <a:ln>
+            <a:headEnd type="triangle"/>
+            <a:tailEnd type="triangle"/>
+          </a:ln>
+        </p:spPr>
+        <p:style>
+          <a:lnRef idx="1">
+            <a:schemeClr val="accent1"/>
+          </a:lnRef>
+          <a:fillRef idx="0">
+            <a:schemeClr val="accent1"/>
+          </a:fillRef>
+          <a:effectRef idx="0">
+            <a:schemeClr val="accent1"/>
+          </a:effectRef>
+          <a:fontRef idx="minor">
+            <a:schemeClr val="tx1"/>
+          </a:fontRef>
+        </p:style>
+      </p:cxnSp>
+      <p:cxnSp>
+        <p:nvCxnSpPr>
+          <p:cNvPr id="32" name="Прямая со стрелкой 31"/>
+          <p:cNvCxnSpPr>
+            <a:stCxn id="7" idx="2"/>
+            <a:endCxn id="4" idx="0"/>
+          </p:cNvCxnSpPr>
+          <p:nvPr/>
+        </p:nvCxnSpPr>
+        <p:spPr>
+          <a:xfrm>
+            <a:off x="2757267" y="5539200"/>
+            <a:ext cx="0" cy="351889"/>
+          </a:xfrm>
+          <a:prstGeom prst="straightConnector1">
+            <a:avLst/>
+          </a:prstGeom>
+          <a:ln>
+            <a:headEnd type="triangle"/>
+            <a:tailEnd type="triangle"/>
+          </a:ln>
+        </p:spPr>
+        <p:style>
+          <a:lnRef idx="1">
+            <a:schemeClr val="accent1"/>
+          </a:lnRef>
+          <a:fillRef idx="0">
+            <a:schemeClr val="accent1"/>
+          </a:fillRef>
+          <a:effectRef idx="0">
+            <a:schemeClr val="accent1"/>
+          </a:effectRef>
+          <a:fontRef idx="minor">
+            <a:schemeClr val="tx1"/>
+          </a:fontRef>
+        </p:style>
+      </p:cxnSp>
+      <p:cxnSp>
+        <p:nvCxnSpPr>
+          <p:cNvPr id="34" name="Прямая со стрелкой 33"/>
+          <p:cNvCxnSpPr>
+            <a:stCxn id="7" idx="3"/>
+            <a:endCxn id="10" idx="1"/>
+          </p:cNvCxnSpPr>
+          <p:nvPr/>
+        </p:nvCxnSpPr>
+        <p:spPr>
+          <a:xfrm flipV="1">
+            <a:off x="3502854" y="5121050"/>
+            <a:ext cx="1329399" cy="10187"/>
+          </a:xfrm>
+          <a:prstGeom prst="straightConnector1">
+            <a:avLst/>
+          </a:prstGeom>
+          <a:ln>
+            <a:headEnd type="triangle"/>
+            <a:tailEnd type="triangle"/>
+          </a:ln>
+        </p:spPr>
+        <p:style>
+          <a:lnRef idx="1">
+            <a:schemeClr val="accent1"/>
+          </a:lnRef>
+          <a:fillRef idx="0">
+            <a:schemeClr val="accent1"/>
+          </a:fillRef>
+          <a:effectRef idx="0">
+            <a:schemeClr val="accent1"/>
+          </a:effectRef>
+          <a:fontRef idx="minor">
+            <a:schemeClr val="tx1"/>
+          </a:fontRef>
+        </p:style>
+      </p:cxnSp>
+      <p:cxnSp>
+        <p:nvCxnSpPr>
+          <p:cNvPr id="40" name="Прямая со стрелкой 39"/>
+          <p:cNvCxnSpPr>
+            <a:stCxn id="20" idx="2"/>
+            <a:endCxn id="10" idx="0"/>
+          </p:cNvCxnSpPr>
+          <p:nvPr/>
+        </p:nvCxnSpPr>
+        <p:spPr>
+          <a:xfrm>
+            <a:off x="5883813" y="4486126"/>
+            <a:ext cx="0" cy="312368"/>
+          </a:xfrm>
+          <a:prstGeom prst="straightConnector1">
+            <a:avLst/>
+          </a:prstGeom>
+          <a:ln>
+            <a:headEnd type="triangle"/>
+            <a:tailEnd type="triangle"/>
+          </a:ln>
+        </p:spPr>
+        <p:style>
+          <a:lnRef idx="1">
+            <a:schemeClr val="accent1"/>
+          </a:lnRef>
+          <a:fillRef idx="0">
+            <a:schemeClr val="accent1"/>
+          </a:fillRef>
+          <a:effectRef idx="0">
+            <a:schemeClr val="accent1"/>
+          </a:effectRef>
+          <a:fontRef idx="minor">
+            <a:schemeClr val="tx1"/>
+          </a:fontRef>
+        </p:style>
+      </p:cxnSp>
+      <p:sp>
+        <p:nvSpPr>
+          <p:cNvPr id="41" name="Прямоугольник 40"/>
+          <p:cNvSpPr/>
+          <p:nvPr/>
+        </p:nvSpPr>
+        <p:spPr>
+          <a:xfrm>
+            <a:off x="5683348" y="2272859"/>
+            <a:ext cx="2504050" cy="1167619"/>
+          </a:xfrm>
+          <a:prstGeom prst="rect">
+            <a:avLst/>
+          </a:prstGeom>
+        </p:spPr>
+        <p:style>
+          <a:lnRef idx="2">
+            <a:schemeClr val="accent1">
+              <a:shade val="50000"/>
+            </a:schemeClr>
+          </a:lnRef>
+          <a:fillRef idx="1">
+            <a:schemeClr val="accent1"/>
+          </a:fillRef>
+          <a:effectRef idx="0">
+            <a:schemeClr val="accent1"/>
+          </a:effectRef>
+          <a:fontRef idx="minor">
+            <a:schemeClr val="lt1"/>
+          </a:fontRef>
+        </p:style>
+        <p:txBody>
+          <a:bodyPr rtlCol="0" anchor="ctr"/>
+          <a:lstStyle/>
+          <a:p>
+            <a:pPr algn="ctr"/>
+            <a:r>
+              <a:rPr lang="ru-RU" dirty="0">
+                <a:latin typeface="Times New Roman" panose="02020603050405020304" pitchFamily="18" charset="0"/>
+                <a:cs typeface="Times New Roman" panose="02020603050405020304" pitchFamily="18" charset="0"/>
+              </a:rPr>
+              <a:t>Комната с двумя дверями и сейфом</a:t>
+            </a:r>
+            <a:endParaRPr lang="ru-RU" dirty="0">
+              <a:latin typeface="Times New Roman" panose="02020603050405020304" pitchFamily="18" charset="0"/>
+              <a:cs typeface="Times New Roman" panose="02020603050405020304" pitchFamily="18" charset="0"/>
+            </a:endParaRPr>
+          </a:p>
+        </p:txBody>
+      </p:sp>
+      <p:cxnSp>
+        <p:nvCxnSpPr>
+          <p:cNvPr id="43" name="Прямая со стрелкой 42"/>
+          <p:cNvCxnSpPr>
+            <a:stCxn id="20" idx="0"/>
+            <a:endCxn id="41" idx="2"/>
+          </p:cNvCxnSpPr>
+          <p:nvPr/>
+        </p:nvCxnSpPr>
+        <p:spPr>
+          <a:xfrm flipV="1">
+            <a:off x="5883813" y="3440478"/>
+            <a:ext cx="1051560" cy="312368"/>
+          </a:xfrm>
+          <a:prstGeom prst="straightConnector1">
+            <a:avLst/>
+          </a:prstGeom>
+          <a:ln>
+            <a:headEnd type="triangle"/>
+            <a:tailEnd type="triangle"/>
+          </a:ln>
+        </p:spPr>
+        <p:style>
+          <a:lnRef idx="1">
+            <a:schemeClr val="accent1"/>
+          </a:lnRef>
+          <a:fillRef idx="0">
+            <a:schemeClr val="accent1"/>
+          </a:fillRef>
+          <a:effectRef idx="0">
+            <a:schemeClr val="accent1"/>
+          </a:effectRef>
+          <a:fontRef idx="minor">
+            <a:schemeClr val="tx1"/>
+          </a:fontRef>
+        </p:style>
+      </p:cxnSp>
+      <p:sp>
+        <p:nvSpPr>
+          <p:cNvPr id="76" name="Прямоугольник 75"/>
+          <p:cNvSpPr/>
+          <p:nvPr/>
+        </p:nvSpPr>
+        <p:spPr>
+          <a:xfrm>
+            <a:off x="2465360" y="1509934"/>
+            <a:ext cx="2074987" cy="1079985"/>
+          </a:xfrm>
+          <a:prstGeom prst="rect">
+            <a:avLst/>
+          </a:prstGeom>
+        </p:spPr>
+        <p:style>
+          <a:lnRef idx="2">
+            <a:schemeClr val="accent1">
+              <a:shade val="50000"/>
+            </a:schemeClr>
+          </a:lnRef>
+          <a:fillRef idx="1">
+            <a:schemeClr val="accent1"/>
+          </a:fillRef>
+          <a:effectRef idx="0">
+            <a:schemeClr val="accent1"/>
+          </a:effectRef>
+          <a:fontRef idx="minor">
+            <a:schemeClr val="lt1"/>
+          </a:fontRef>
+        </p:style>
+        <p:txBody>
+          <a:bodyPr rtlCol="0" anchor="ctr"/>
+          <a:lstStyle/>
+          <a:p>
+            <a:pPr algn="ctr"/>
+            <a:r>
+              <a:rPr lang="ru-RU" dirty="0" smtClean="0">
+                <a:latin typeface="Times New Roman" panose="02020603050405020304" pitchFamily="18" charset="0"/>
+                <a:cs typeface="Times New Roman" panose="02020603050405020304" pitchFamily="18" charset="0"/>
+              </a:rPr>
+              <a:t>Комната №1 со многими вещами</a:t>
+            </a:r>
+            <a:endParaRPr lang="ru-RU" dirty="0">
+              <a:latin typeface="Times New Roman" panose="02020603050405020304" pitchFamily="18" charset="0"/>
+              <a:cs typeface="Times New Roman" panose="02020603050405020304" pitchFamily="18" charset="0"/>
+            </a:endParaRPr>
+          </a:p>
+        </p:txBody>
+      </p:sp>
+      <p:sp>
+        <p:nvSpPr>
+          <p:cNvPr id="77" name="Прямоугольник 76"/>
+          <p:cNvSpPr/>
+          <p:nvPr/>
+        </p:nvSpPr>
+        <p:spPr>
+          <a:xfrm>
+            <a:off x="9330399" y="1459219"/>
+            <a:ext cx="2074987" cy="1079985"/>
+          </a:xfrm>
+          <a:prstGeom prst="rect">
+            <a:avLst/>
+          </a:prstGeom>
+        </p:spPr>
+        <p:style>
+          <a:lnRef idx="2">
+            <a:schemeClr val="accent1">
+              <a:shade val="50000"/>
+            </a:schemeClr>
+          </a:lnRef>
+          <a:fillRef idx="1">
+            <a:schemeClr val="accent1"/>
+          </a:fillRef>
+          <a:effectRef idx="0">
+            <a:schemeClr val="accent1"/>
+          </a:effectRef>
+          <a:fontRef idx="minor">
+            <a:schemeClr val="lt1"/>
+          </a:fontRef>
+        </p:style>
+        <p:txBody>
+          <a:bodyPr rtlCol="0" anchor="ctr"/>
+          <a:lstStyle/>
+          <a:p>
+            <a:pPr algn="ctr"/>
+            <a:r>
+              <a:rPr lang="ru-RU" dirty="0" smtClean="0">
+                <a:latin typeface="Times New Roman" panose="02020603050405020304" pitchFamily="18" charset="0"/>
+                <a:cs typeface="Times New Roman" panose="02020603050405020304" pitchFamily="18" charset="0"/>
+              </a:rPr>
+              <a:t>Комната №2 со многими вещами</a:t>
+            </a:r>
+            <a:endParaRPr lang="ru-RU" dirty="0">
+              <a:latin typeface="Times New Roman" panose="02020603050405020304" pitchFamily="18" charset="0"/>
+              <a:cs typeface="Times New Roman" panose="02020603050405020304" pitchFamily="18" charset="0"/>
+            </a:endParaRPr>
+          </a:p>
+        </p:txBody>
+      </p:sp>
+      <p:cxnSp>
+        <p:nvCxnSpPr>
+          <p:cNvPr id="79" name="Прямая со стрелкой 78"/>
+          <p:cNvCxnSpPr>
+            <a:stCxn id="76" idx="2"/>
+            <a:endCxn id="41" idx="1"/>
+          </p:cNvCxnSpPr>
+          <p:nvPr/>
+        </p:nvCxnSpPr>
+        <p:spPr>
+          <a:xfrm>
+            <a:off x="3502854" y="2589919"/>
+            <a:ext cx="2180494" cy="266750"/>
+          </a:xfrm>
+          <a:prstGeom prst="straightConnector1">
+            <a:avLst/>
+          </a:prstGeom>
+          <a:ln>
+            <a:headEnd type="triangle"/>
+            <a:tailEnd type="triangle"/>
+          </a:ln>
+        </p:spPr>
+        <p:style>
+          <a:lnRef idx="1">
+            <a:schemeClr val="accent1"/>
+          </a:lnRef>
+          <a:fillRef idx="0">
+            <a:schemeClr val="accent1"/>
+          </a:fillRef>
+          <a:effectRef idx="0">
+            <a:schemeClr val="accent1"/>
+          </a:effectRef>
+          <a:fontRef idx="minor">
+            <a:schemeClr val="tx1"/>
+          </a:fontRef>
+        </p:style>
+      </p:cxnSp>
+      <p:cxnSp>
+        <p:nvCxnSpPr>
+          <p:cNvPr id="81" name="Прямая со стрелкой 80"/>
+          <p:cNvCxnSpPr>
+            <a:stCxn id="41" idx="3"/>
+            <a:endCxn id="77" idx="2"/>
+          </p:cNvCxnSpPr>
+          <p:nvPr/>
+        </p:nvCxnSpPr>
+        <p:spPr>
+          <a:xfrm flipV="1">
+            <a:off x="8187398" y="2539204"/>
+            <a:ext cx="2180495" cy="317465"/>
+          </a:xfrm>
+          <a:prstGeom prst="straightConnector1">
+            <a:avLst/>
+          </a:prstGeom>
+          <a:ln>
+            <a:headEnd type="triangle"/>
+            <a:tailEnd type="triangle"/>
+          </a:ln>
+        </p:spPr>
+        <p:style>
+          <a:lnRef idx="1">
+            <a:schemeClr val="accent1"/>
+          </a:lnRef>
+          <a:fillRef idx="0">
+            <a:schemeClr val="accent1"/>
+          </a:fillRef>
+          <a:effectRef idx="0">
+            <a:schemeClr val="accent1"/>
+          </a:effectRef>
+          <a:fontRef idx="minor">
+            <a:schemeClr val="tx1"/>
+          </a:fontRef>
+        </p:style>
+      </p:cxnSp>
     </p:spTree>
     <p:extLst>
       <p:ext uri="{BB962C8B-B14F-4D97-AF65-F5344CB8AC3E}">
-        <p14:creationId xmlns:p14="http://schemas.microsoft.com/office/powerpoint/2010/main" val="4159308486"/>
+        <p14:creationId xmlns:p14="http://schemas.microsoft.com/office/powerpoint/2010/main" val="2399156550"/>
       </p:ext>
     </p:extLst>
   </p:cSld>
   <p:clrMapOvr>
     <a:masterClrMapping/>
   </p:clrMapOvr>
+  <p:timing>
+    <p:tnLst>
+      <p:par>
+        <p:cTn id="1" dur="indefinite" restart="never" nodeType="tmRoot"/>
+      </p:par>
+    </p:tnLst>
+  </p:timing>
+</p:sld>
+</file>
+
+<file path=ppt/slides/slide5.xml><?xml version="1.0" encoding="utf-8"?>
+<p:sld xmlns:a="http://schemas.openxmlformats.org/drawingml/2006/main" xmlns:r="http://schemas.openxmlformats.org/officeDocument/2006/relationships" xmlns:p="http://schemas.openxmlformats.org/presentationml/2006/main">
+  <p:cSld>
+    <p:spTree>
+      <p:nvGrpSpPr>
+        <p:cNvPr id="1" name=""/>
+        <p:cNvGrpSpPr/>
+        <p:nvPr/>
+      </p:nvGrpSpPr>
+      <p:grpSpPr>
+        <a:xfrm>
+          <a:off x="0" y="0"/>
+          <a:ext cx="0" cy="0"/>
+          <a:chOff x="0" y="0"/>
+          <a:chExt cx="0" cy="0"/>
+        </a:xfrm>
+      </p:grpSpPr>
+      <p:sp>
+        <p:nvSpPr>
+          <p:cNvPr id="2" name="Заголовок 1"/>
+          <p:cNvSpPr>
+            <a:spLocks noGrp="1"/>
+          </p:cNvSpPr>
+          <p:nvPr>
+            <p:ph type="title"/>
+          </p:nvPr>
+        </p:nvSpPr>
+        <p:spPr/>
+        <p:txBody>
+          <a:bodyPr/>
+          <a:lstStyle/>
+          <a:p>
+            <a:pPr algn="ctr"/>
+            <a:r>
+              <a:rPr lang="ru-RU" dirty="0" err="1" smtClean="0">
+                <a:latin typeface="Times New Roman" panose="02020603050405020304" pitchFamily="18" charset="0"/>
+                <a:cs typeface="Times New Roman" panose="02020603050405020304" pitchFamily="18" charset="0"/>
+              </a:rPr>
+              <a:t>Стуктура</a:t>
+            </a:r>
+            <a:r>
+              <a:rPr lang="ru-RU" dirty="0" smtClean="0">
+                <a:latin typeface="Times New Roman" panose="02020603050405020304" pitchFamily="18" charset="0"/>
+                <a:cs typeface="Times New Roman" panose="02020603050405020304" pitchFamily="18" charset="0"/>
+              </a:rPr>
+              <a:t>.</a:t>
+            </a:r>
+            <a:endParaRPr lang="ru-RU" dirty="0">
+              <a:latin typeface="Times New Roman" panose="02020603050405020304" pitchFamily="18" charset="0"/>
+              <a:cs typeface="Times New Roman" panose="02020603050405020304" pitchFamily="18" charset="0"/>
+            </a:endParaRPr>
+          </a:p>
+        </p:txBody>
+      </p:sp>
+      <p:sp>
+        <p:nvSpPr>
+          <p:cNvPr id="3" name="Объект 2"/>
+          <p:cNvSpPr>
+            <a:spLocks noGrp="1"/>
+          </p:cNvSpPr>
+          <p:nvPr>
+            <p:ph idx="1"/>
+          </p:nvPr>
+        </p:nvSpPr>
+        <p:spPr/>
+        <p:txBody>
+          <a:bodyPr>
+            <a:normAutofit/>
+          </a:bodyPr>
+          <a:lstStyle/>
+          <a:p>
+            <a:pPr marL="0" indent="0">
+              <a:buNone/>
+            </a:pPr>
+            <a:r>
+              <a:rPr lang="en-US" dirty="0">
+                <a:latin typeface="Times New Roman" panose="02020603050405020304" pitchFamily="18" charset="0"/>
+                <a:cs typeface="Times New Roman" panose="02020603050405020304" pitchFamily="18" charset="0"/>
+              </a:rPr>
+              <a:t>d</a:t>
+            </a:r>
+            <a:r>
+              <a:rPr lang="en-US" dirty="0" smtClean="0">
+                <a:latin typeface="Times New Roman" panose="02020603050405020304" pitchFamily="18" charset="0"/>
+                <a:cs typeface="Times New Roman" panose="02020603050405020304" pitchFamily="18" charset="0"/>
+              </a:rPr>
+              <a:t>ialogs.py – </a:t>
+            </a:r>
+            <a:r>
+              <a:rPr lang="ru-RU" dirty="0" smtClean="0">
+                <a:latin typeface="Times New Roman" panose="02020603050405020304" pitchFamily="18" charset="0"/>
+                <a:cs typeface="Times New Roman" panose="02020603050405020304" pitchFamily="18" charset="0"/>
+              </a:rPr>
+              <a:t>файл, содержащий файлы для диалога с пользователем</a:t>
+            </a:r>
+          </a:p>
+          <a:p>
+            <a:pPr marL="0" indent="0">
+              <a:buNone/>
+            </a:pPr>
+            <a:r>
+              <a:rPr lang="en-US" dirty="0" smtClean="0">
+                <a:latin typeface="Times New Roman" panose="02020603050405020304" pitchFamily="18" charset="0"/>
+                <a:cs typeface="Times New Roman" panose="02020603050405020304" pitchFamily="18" charset="0"/>
+              </a:rPr>
+              <a:t>f</a:t>
+            </a:r>
+            <a:r>
+              <a:rPr lang="en-US" dirty="0" smtClean="0">
+                <a:latin typeface="Times New Roman" panose="02020603050405020304" pitchFamily="18" charset="0"/>
+                <a:cs typeface="Times New Roman" panose="02020603050405020304" pitchFamily="18" charset="0"/>
+              </a:rPr>
+              <a:t>lask_app.py </a:t>
+            </a:r>
+            <a:r>
+              <a:rPr lang="en-US" dirty="0" smtClean="0">
+                <a:latin typeface="Times New Roman" panose="02020603050405020304" pitchFamily="18" charset="0"/>
+                <a:cs typeface="Times New Roman" panose="02020603050405020304" pitchFamily="18" charset="0"/>
+              </a:rPr>
+              <a:t>–</a:t>
+            </a:r>
+            <a:r>
+              <a:rPr lang="ru-RU" dirty="0" smtClean="0">
+                <a:latin typeface="Times New Roman" panose="02020603050405020304" pitchFamily="18" charset="0"/>
+                <a:cs typeface="Times New Roman" panose="02020603050405020304" pitchFamily="18" charset="0"/>
+              </a:rPr>
+              <a:t> файл, запускающий навык</a:t>
+            </a:r>
+          </a:p>
+          <a:p>
+            <a:pPr marL="0" indent="0">
+              <a:buNone/>
+            </a:pPr>
+            <a:r>
+              <a:rPr lang="en-US" dirty="0">
+                <a:latin typeface="Times New Roman" panose="02020603050405020304" pitchFamily="18" charset="0"/>
+                <a:cs typeface="Times New Roman" panose="02020603050405020304" pitchFamily="18" charset="0"/>
+              </a:rPr>
+              <a:t>f</a:t>
+            </a:r>
+            <a:r>
+              <a:rPr lang="en-US" dirty="0" smtClean="0">
+                <a:latin typeface="Times New Roman" panose="02020603050405020304" pitchFamily="18" charset="0"/>
+                <a:cs typeface="Times New Roman" panose="02020603050405020304" pitchFamily="18" charset="0"/>
+              </a:rPr>
+              <a:t>orresponse.py </a:t>
+            </a:r>
+            <a:r>
+              <a:rPr lang="en-US" dirty="0" smtClean="0">
+                <a:latin typeface="Times New Roman" panose="02020603050405020304" pitchFamily="18" charset="0"/>
+                <a:cs typeface="Times New Roman" panose="02020603050405020304" pitchFamily="18" charset="0"/>
+              </a:rPr>
+              <a:t>– </a:t>
+            </a:r>
+            <a:r>
+              <a:rPr lang="ru-RU" dirty="0" smtClean="0">
+                <a:latin typeface="Times New Roman" panose="02020603050405020304" pitchFamily="18" charset="0"/>
+                <a:cs typeface="Times New Roman" panose="02020603050405020304" pitchFamily="18" charset="0"/>
+              </a:rPr>
+              <a:t>файл, содержащий класс, предназначенный для упрощающей работы с ответом на команду пользователя</a:t>
+            </a:r>
+          </a:p>
+          <a:p>
+            <a:pPr marL="0" indent="0">
+              <a:buNone/>
+            </a:pPr>
+            <a:r>
+              <a:rPr lang="en-US" dirty="0" smtClean="0">
+                <a:latin typeface="Times New Roman" panose="02020603050405020304" pitchFamily="18" charset="0"/>
+                <a:cs typeface="Times New Roman" panose="02020603050405020304" pitchFamily="18" charset="0"/>
+              </a:rPr>
+              <a:t>i</a:t>
+            </a:r>
+            <a:r>
+              <a:rPr lang="en-US" dirty="0" smtClean="0">
+                <a:latin typeface="Times New Roman" panose="02020603050405020304" pitchFamily="18" charset="0"/>
+                <a:cs typeface="Times New Roman" panose="02020603050405020304" pitchFamily="18" charset="0"/>
+              </a:rPr>
+              <a:t>mages.py </a:t>
+            </a:r>
+            <a:r>
+              <a:rPr lang="en-US" dirty="0" smtClean="0">
+                <a:latin typeface="Times New Roman" panose="02020603050405020304" pitchFamily="18" charset="0"/>
+                <a:cs typeface="Times New Roman" panose="02020603050405020304" pitchFamily="18" charset="0"/>
+              </a:rPr>
+              <a:t>– </a:t>
+            </a:r>
+            <a:r>
+              <a:rPr lang="ru-RU" dirty="0" smtClean="0">
+                <a:latin typeface="Times New Roman" panose="02020603050405020304" pitchFamily="18" charset="0"/>
+                <a:cs typeface="Times New Roman" panose="02020603050405020304" pitchFamily="18" charset="0"/>
+              </a:rPr>
+              <a:t>файл, содержащий</a:t>
+            </a:r>
+            <a:r>
+              <a:rPr lang="en-US" dirty="0" smtClean="0">
+                <a:latin typeface="Times New Roman" panose="02020603050405020304" pitchFamily="18" charset="0"/>
+                <a:cs typeface="Times New Roman" panose="02020603050405020304" pitchFamily="18" charset="0"/>
+              </a:rPr>
+              <a:t> </a:t>
+            </a:r>
+            <a:r>
+              <a:rPr lang="ru-RU" dirty="0" smtClean="0">
+                <a:latin typeface="Times New Roman" panose="02020603050405020304" pitchFamily="18" charset="0"/>
+                <a:cs typeface="Times New Roman" panose="02020603050405020304" pitchFamily="18" charset="0"/>
+              </a:rPr>
+              <a:t>класс, в котором находятся</a:t>
+            </a:r>
+            <a:r>
+              <a:rPr lang="en-US" dirty="0" smtClean="0">
+                <a:latin typeface="Times New Roman" panose="02020603050405020304" pitchFamily="18" charset="0"/>
+                <a:cs typeface="Times New Roman" panose="02020603050405020304" pitchFamily="18" charset="0"/>
+              </a:rPr>
+              <a:t> </a:t>
+            </a:r>
+            <a:r>
+              <a:rPr lang="ru-RU" dirty="0" smtClean="0">
+                <a:latin typeface="Times New Roman" panose="02020603050405020304" pitchFamily="18" charset="0"/>
+                <a:cs typeface="Times New Roman" panose="02020603050405020304" pitchFamily="18" charset="0"/>
+              </a:rPr>
+              <a:t>идентификаторы для </a:t>
+            </a:r>
+            <a:r>
+              <a:rPr lang="en-US" dirty="0" err="1" smtClean="0">
+                <a:latin typeface="Times New Roman" panose="02020603050405020304" pitchFamily="18" charset="0"/>
+                <a:cs typeface="Times New Roman" panose="02020603050405020304" pitchFamily="18" charset="0"/>
+              </a:rPr>
+              <a:t>api</a:t>
+            </a:r>
+            <a:r>
+              <a:rPr lang="en-US" dirty="0" smtClean="0">
+                <a:latin typeface="Times New Roman" panose="02020603050405020304" pitchFamily="18" charset="0"/>
+                <a:cs typeface="Times New Roman" panose="02020603050405020304" pitchFamily="18" charset="0"/>
+              </a:rPr>
+              <a:t> </a:t>
+            </a:r>
+            <a:r>
+              <a:rPr lang="ru-RU" dirty="0" err="1" smtClean="0">
+                <a:latin typeface="Times New Roman" panose="02020603050405020304" pitchFamily="18" charset="0"/>
+                <a:cs typeface="Times New Roman" panose="02020603050405020304" pitchFamily="18" charset="0"/>
+              </a:rPr>
+              <a:t>яндекс.диалогов</a:t>
+            </a:r>
+            <a:endParaRPr lang="ru-RU" dirty="0" smtClean="0">
+              <a:latin typeface="Times New Roman" panose="02020603050405020304" pitchFamily="18" charset="0"/>
+              <a:cs typeface="Times New Roman" panose="02020603050405020304" pitchFamily="18" charset="0"/>
+            </a:endParaRPr>
+          </a:p>
+          <a:p>
+            <a:pPr marL="0" indent="0">
+              <a:buNone/>
+            </a:pPr>
+            <a:r>
+              <a:rPr lang="en-US" dirty="0">
+                <a:latin typeface="Times New Roman" panose="02020603050405020304" pitchFamily="18" charset="0"/>
+                <a:cs typeface="Times New Roman" panose="02020603050405020304" pitchFamily="18" charset="0"/>
+              </a:rPr>
+              <a:t>q</a:t>
+            </a:r>
+            <a:r>
+              <a:rPr lang="en-US" dirty="0" smtClean="0">
+                <a:latin typeface="Times New Roman" panose="02020603050405020304" pitchFamily="18" charset="0"/>
+                <a:cs typeface="Times New Roman" panose="02020603050405020304" pitchFamily="18" charset="0"/>
+              </a:rPr>
+              <a:t>uest.py </a:t>
+            </a:r>
+            <a:r>
+              <a:rPr lang="en-US" dirty="0" smtClean="0">
+                <a:latin typeface="Times New Roman" panose="02020603050405020304" pitchFamily="18" charset="0"/>
+                <a:cs typeface="Times New Roman" panose="02020603050405020304" pitchFamily="18" charset="0"/>
+              </a:rPr>
+              <a:t>– </a:t>
+            </a:r>
+            <a:r>
+              <a:rPr lang="ru-RU" dirty="0" smtClean="0">
+                <a:latin typeface="Times New Roman" panose="02020603050405020304" pitchFamily="18" charset="0"/>
+                <a:cs typeface="Times New Roman" panose="02020603050405020304" pitchFamily="18" charset="0"/>
+              </a:rPr>
+              <a:t>основной файл, содержащий код для создания квеста</a:t>
+            </a:r>
+          </a:p>
+          <a:p>
+            <a:pPr marL="0" indent="0">
+              <a:buNone/>
+            </a:pPr>
+            <a:r>
+              <a:rPr lang="en-US" dirty="0">
+                <a:latin typeface="Times New Roman" panose="02020603050405020304" pitchFamily="18" charset="0"/>
+                <a:cs typeface="Times New Roman" panose="02020603050405020304" pitchFamily="18" charset="0"/>
+              </a:rPr>
+              <a:t>u</a:t>
+            </a:r>
+            <a:r>
+              <a:rPr lang="en-US" dirty="0" smtClean="0">
+                <a:latin typeface="Times New Roman" panose="02020603050405020304" pitchFamily="18" charset="0"/>
+                <a:cs typeface="Times New Roman" panose="02020603050405020304" pitchFamily="18" charset="0"/>
+              </a:rPr>
+              <a:t>seractions.py </a:t>
+            </a:r>
+            <a:r>
+              <a:rPr lang="en-US" dirty="0" smtClean="0">
+                <a:latin typeface="Times New Roman" panose="02020603050405020304" pitchFamily="18" charset="0"/>
+                <a:cs typeface="Times New Roman" panose="02020603050405020304" pitchFamily="18" charset="0"/>
+              </a:rPr>
+              <a:t>– </a:t>
+            </a:r>
+            <a:r>
+              <a:rPr lang="ru-RU" dirty="0" smtClean="0">
+                <a:latin typeface="Times New Roman" panose="02020603050405020304" pitchFamily="18" charset="0"/>
+                <a:cs typeface="Times New Roman" panose="02020603050405020304" pitchFamily="18" charset="0"/>
+              </a:rPr>
+              <a:t>файл, отслеживающий действия пользователя на протяжении всего квеста</a:t>
+            </a:r>
+            <a:endParaRPr lang="ru-RU" dirty="0">
+              <a:latin typeface="Times New Roman" panose="02020603050405020304" pitchFamily="18" charset="0"/>
+              <a:cs typeface="Times New Roman" panose="02020603050405020304" pitchFamily="18" charset="0"/>
+            </a:endParaRPr>
+          </a:p>
+        </p:txBody>
+      </p:sp>
+    </p:spTree>
+    <p:extLst>
+      <p:ext uri="{BB962C8B-B14F-4D97-AF65-F5344CB8AC3E}">
+        <p14:creationId xmlns:p14="http://schemas.microsoft.com/office/powerpoint/2010/main" val="3244797553"/>
+      </p:ext>
+    </p:extLst>
+  </p:cSld>
+  <p:clrMapOvr>
+    <a:masterClrMapping/>
+  </p:clrMapOvr>
+  <p:timing>
+    <p:tnLst>
+      <p:par>
+        <p:cTn id="1" dur="indefinite" restart="never" nodeType="tmRoot"/>
+      </p:par>
+    </p:tnLst>
+  </p:timing>
+</p:sld>
+</file>
+
+<file path=ppt/slides/slide6.xml><?xml version="1.0" encoding="utf-8"?>
+<p:sld xmlns:a="http://schemas.openxmlformats.org/drawingml/2006/main" xmlns:r="http://schemas.openxmlformats.org/officeDocument/2006/relationships" xmlns:p="http://schemas.openxmlformats.org/presentationml/2006/main">
+  <p:cSld>
+    <p:spTree>
+      <p:nvGrpSpPr>
+        <p:cNvPr id="1" name=""/>
+        <p:cNvGrpSpPr/>
+        <p:nvPr/>
+      </p:nvGrpSpPr>
+      <p:grpSpPr>
+        <a:xfrm>
+          <a:off x="0" y="0"/>
+          <a:ext cx="0" cy="0"/>
+          <a:chOff x="0" y="0"/>
+          <a:chExt cx="0" cy="0"/>
+        </a:xfrm>
+      </p:grpSpPr>
+      <p:sp>
+        <p:nvSpPr>
+          <p:cNvPr id="2" name="Заголовок 1"/>
+          <p:cNvSpPr>
+            <a:spLocks noGrp="1"/>
+          </p:cNvSpPr>
+          <p:nvPr>
+            <p:ph type="title"/>
+          </p:nvPr>
+        </p:nvSpPr>
+        <p:spPr/>
+        <p:txBody>
+          <a:bodyPr/>
+          <a:lstStyle/>
+          <a:p>
+            <a:pPr algn="ctr"/>
+            <a:r>
+              <a:rPr lang="ru-RU" dirty="0" smtClean="0">
+                <a:latin typeface="Times New Roman" panose="02020603050405020304" pitchFamily="18" charset="0"/>
+                <a:cs typeface="Times New Roman" panose="02020603050405020304" pitchFamily="18" charset="0"/>
+              </a:rPr>
+              <a:t>Скриншоты</a:t>
+            </a:r>
+            <a:endParaRPr lang="ru-RU" dirty="0">
+              <a:latin typeface="Times New Roman" panose="02020603050405020304" pitchFamily="18" charset="0"/>
+              <a:cs typeface="Times New Roman" panose="02020603050405020304" pitchFamily="18" charset="0"/>
+            </a:endParaRPr>
+          </a:p>
+        </p:txBody>
+      </p:sp>
+      <p:pic>
+        <p:nvPicPr>
+          <p:cNvPr id="5" name="Объект 4"/>
+          <p:cNvPicPr>
+            <a:picLocks noGrp="1" noChangeAspect="1"/>
+          </p:cNvPicPr>
+          <p:nvPr>
+            <p:ph sz="half" idx="1"/>
+          </p:nvPr>
+        </p:nvPicPr>
+        <p:blipFill>
+          <a:blip r:embed="rId2"/>
+          <a:stretch>
+            <a:fillRect/>
+          </a:stretch>
+        </p:blipFill>
+        <p:spPr>
+          <a:xfrm>
+            <a:off x="1076325" y="2029619"/>
+            <a:ext cx="4705350" cy="3943350"/>
+          </a:xfrm>
+          <a:prstGeom prst="rect">
+            <a:avLst/>
+          </a:prstGeom>
+        </p:spPr>
+      </p:pic>
+      <p:pic>
+        <p:nvPicPr>
+          <p:cNvPr id="6" name="Объект 5"/>
+          <p:cNvPicPr>
+            <a:picLocks noGrp="1" noChangeAspect="1"/>
+          </p:cNvPicPr>
+          <p:nvPr>
+            <p:ph sz="half" idx="2"/>
+          </p:nvPr>
+        </p:nvPicPr>
+        <p:blipFill>
+          <a:blip r:embed="rId3"/>
+          <a:stretch>
+            <a:fillRect/>
+          </a:stretch>
+        </p:blipFill>
+        <p:spPr>
+          <a:xfrm>
+            <a:off x="6372225" y="2043906"/>
+            <a:ext cx="4781550" cy="3914775"/>
+          </a:xfrm>
+          <a:prstGeom prst="rect">
+            <a:avLst/>
+          </a:prstGeom>
+        </p:spPr>
+      </p:pic>
+    </p:spTree>
+    <p:extLst>
+      <p:ext uri="{BB962C8B-B14F-4D97-AF65-F5344CB8AC3E}">
+        <p14:creationId xmlns:p14="http://schemas.microsoft.com/office/powerpoint/2010/main" val="2878029411"/>
+      </p:ext>
+    </p:extLst>
+  </p:cSld>
+  <p:clrMapOvr>
+    <a:masterClrMapping/>
+  </p:clrMapOvr>
+  <p:timing>
+    <p:tnLst>
+      <p:par>
+        <p:cTn id="1" dur="indefinite" restart="never" nodeType="tmRoot"/>
+      </p:par>
+    </p:tnLst>
+  </p:timing>
+</p:sld>
+</file>
+
+<file path=ppt/slides/slide7.xml><?xml version="1.0" encoding="utf-8"?>
+<p:sld xmlns:a="http://schemas.openxmlformats.org/drawingml/2006/main" xmlns:r="http://schemas.openxmlformats.org/officeDocument/2006/relationships" xmlns:p="http://schemas.openxmlformats.org/presentationml/2006/main">
+  <p:cSld>
+    <p:spTree>
+      <p:nvGrpSpPr>
+        <p:cNvPr id="1" name=""/>
+        <p:cNvGrpSpPr/>
+        <p:nvPr/>
+      </p:nvGrpSpPr>
+      <p:grpSpPr>
+        <a:xfrm>
+          <a:off x="0" y="0"/>
+          <a:ext cx="0" cy="0"/>
+          <a:chOff x="0" y="0"/>
+          <a:chExt cx="0" cy="0"/>
+        </a:xfrm>
+      </p:grpSpPr>
+      <p:sp>
+        <p:nvSpPr>
+          <p:cNvPr id="2" name="Заголовок 1"/>
+          <p:cNvSpPr>
+            <a:spLocks noGrp="1"/>
+          </p:cNvSpPr>
+          <p:nvPr>
+            <p:ph type="title"/>
+          </p:nvPr>
+        </p:nvSpPr>
+        <p:spPr/>
+        <p:txBody>
+          <a:bodyPr/>
+          <a:lstStyle/>
+          <a:p>
+            <a:r>
+              <a:rPr lang="ru-RU" dirty="0" smtClean="0"/>
+              <a:t>Дополнительная информация</a:t>
+            </a:r>
+            <a:endParaRPr lang="ru-RU" dirty="0"/>
+          </a:p>
+        </p:txBody>
+      </p:sp>
+      <p:sp>
+        <p:nvSpPr>
+          <p:cNvPr id="3" name="Объект 2"/>
+          <p:cNvSpPr>
+            <a:spLocks noGrp="1"/>
+          </p:cNvSpPr>
+          <p:nvPr>
+            <p:ph idx="1"/>
+          </p:nvPr>
+        </p:nvSpPr>
+        <p:spPr/>
+        <p:txBody>
+          <a:bodyPr>
+            <a:normAutofit/>
+          </a:bodyPr>
+          <a:lstStyle/>
+          <a:p>
+            <a:pPr marL="0" indent="0" algn="just">
+              <a:buNone/>
+            </a:pPr>
+            <a:r>
+              <a:rPr lang="ru-RU" dirty="0" smtClean="0"/>
+              <a:t>При создании данного квеста использовалось следующее программное обеспечение</a:t>
+            </a:r>
+            <a:r>
+              <a:rPr lang="en-US" dirty="0" smtClean="0"/>
+              <a:t>:</a:t>
+            </a:r>
+          </a:p>
+          <a:p>
+            <a:pPr lvl="1" algn="just"/>
+            <a:r>
+              <a:rPr lang="en-US" dirty="0" err="1" smtClean="0"/>
+              <a:t>PyCharm</a:t>
+            </a:r>
+            <a:r>
+              <a:rPr lang="en-US" dirty="0" smtClean="0"/>
+              <a:t> </a:t>
+            </a:r>
+            <a:r>
+              <a:rPr lang="en-US" dirty="0"/>
+              <a:t>2018 </a:t>
+            </a:r>
+            <a:r>
+              <a:rPr lang="en-US" dirty="0" smtClean="0"/>
+              <a:t>Community </a:t>
+            </a:r>
+            <a:r>
+              <a:rPr lang="en-US" dirty="0"/>
+              <a:t>Edition</a:t>
+            </a:r>
+          </a:p>
+          <a:p>
+            <a:pPr lvl="1" algn="just"/>
+            <a:r>
+              <a:rPr lang="en-US" dirty="0"/>
+              <a:t>Adobe Photoshop </a:t>
+            </a:r>
+            <a:r>
+              <a:rPr lang="en-US" dirty="0" smtClean="0"/>
+              <a:t>CC</a:t>
+            </a:r>
+            <a:endParaRPr lang="ru-RU" dirty="0"/>
+          </a:p>
+          <a:p>
+            <a:pPr marL="0" indent="0">
+              <a:buNone/>
+            </a:pPr>
+            <a:r>
+              <a:rPr lang="ru-RU" dirty="0"/>
+              <a:t>Использованные </a:t>
+            </a:r>
+            <a:r>
+              <a:rPr lang="ru-RU" dirty="0" err="1" smtClean="0"/>
+              <a:t>фреймворки</a:t>
+            </a:r>
+            <a:r>
+              <a:rPr lang="en-US" dirty="0" smtClean="0"/>
+              <a:t>:</a:t>
+            </a:r>
+          </a:p>
+          <a:p>
+            <a:pPr lvl="1"/>
+            <a:r>
+              <a:rPr lang="en-US" b="1" dirty="0" smtClean="0"/>
+              <a:t>Flask</a:t>
+            </a:r>
+          </a:p>
+          <a:p>
+            <a:pPr lvl="1"/>
+            <a:r>
+              <a:rPr lang="en-US" b="1" dirty="0"/>
+              <a:t>r</a:t>
+            </a:r>
+            <a:r>
+              <a:rPr lang="en-US" b="1" dirty="0" smtClean="0"/>
+              <a:t>equests</a:t>
+            </a:r>
+            <a:endParaRPr lang="ru-RU" dirty="0">
+              <a:latin typeface="Times New Roman" panose="02020603050405020304" pitchFamily="18" charset="0"/>
+              <a:cs typeface="Times New Roman" panose="02020603050405020304" pitchFamily="18" charset="0"/>
+            </a:endParaRPr>
+          </a:p>
+          <a:p>
+            <a:pPr marL="0" indent="0" algn="just">
+              <a:buNone/>
+            </a:pPr>
+            <a:r>
+              <a:rPr lang="ru-RU" dirty="0">
+                <a:latin typeface="Times New Roman" panose="02020603050405020304" pitchFamily="18" charset="0"/>
+                <a:cs typeface="Times New Roman" panose="02020603050405020304" pitchFamily="18" charset="0"/>
+              </a:rPr>
+              <a:t>Изображения, используемые в диалоге взяты из интернета</a:t>
+            </a:r>
+            <a:r>
+              <a:rPr lang="ru-RU" dirty="0" smtClean="0">
+                <a:latin typeface="Times New Roman" panose="02020603050405020304" pitchFamily="18" charset="0"/>
+                <a:cs typeface="Times New Roman" panose="02020603050405020304" pitchFamily="18" charset="0"/>
+              </a:rPr>
+              <a:t>.</a:t>
+            </a:r>
+          </a:p>
+          <a:p>
+            <a:pPr marL="0" indent="0" algn="just">
+              <a:buNone/>
+            </a:pPr>
+            <a:endParaRPr lang="en-US" dirty="0">
+              <a:latin typeface="Times New Roman" panose="02020603050405020304" pitchFamily="18" charset="0"/>
+              <a:cs typeface="Times New Roman" panose="02020603050405020304" pitchFamily="18" charset="0"/>
+            </a:endParaRPr>
+          </a:p>
+        </p:txBody>
+      </p:sp>
+    </p:spTree>
+    <p:extLst>
+      <p:ext uri="{BB962C8B-B14F-4D97-AF65-F5344CB8AC3E}">
+        <p14:creationId xmlns:p14="http://schemas.microsoft.com/office/powerpoint/2010/main" val="92594525"/>
+      </p:ext>
+    </p:extLst>
+  </p:cSld>
+  <p:clrMapOvr>
+    <a:masterClrMapping/>
+  </p:clrMapOvr>
+  <p:timing>
+    <p:tnLst>
+      <p:par>
+        <p:cTn id="1" dur="indefinite" restart="never" nodeType="tmRoot"/>
+      </p:par>
+    </p:tnLst>
+  </p:timing>
 </p:sld>
 </file>
 

</xml_diff>